<commit_message>
PPT with butterfly pic on text slides. [Elise]
git-svn-id: http://nescent-anatomy-course.googlecode.com/svn/trunk/2013_course@364 586f635c-ba50-3696-6e8c-0f279cf0028a
</commit_message>
<xml_diff>
--- a/user/shared/Larsen_NESCENT_2013.pptx
+++ b/user/shared/Larsen_NESCENT_2013.pptx
@@ -3446,23 +3446,46 @@
           <a:p>
             <a:r>
               <a:rPr lang="en-US" sz="2800" dirty="0" smtClean="0"/>
-              <a:t>Take </a:t>
-            </a:r>
-            <a:r>
-              <a:rPr lang="en-US" sz="2800" dirty="0" smtClean="0"/>
-              <a:t>part in ENVO </a:t>
-            </a:r>
-            <a:r>
-              <a:rPr lang="en-US" sz="2800" dirty="0" smtClean="0"/>
-              <a:t>development</a:t>
-            </a:r>
-            <a:endParaRPr lang="en-US" sz="2800" dirty="0" smtClean="0"/>
+              <a:t>Take part in ENVO development</a:t>
+            </a:r>
           </a:p>
           <a:p>
             <a:endParaRPr lang="en-US" sz="2800" dirty="0"/>
           </a:p>
         </p:txBody>
       </p:sp>
+      <p:pic>
+        <p:nvPicPr>
+          <p:cNvPr id="4" name="Picture 3" descr="monarch"/>
+          <p:cNvPicPr>
+            <a:picLocks noChangeAspect="1" noChangeArrowheads="1"/>
+          </p:cNvPicPr>
+          <p:nvPr/>
+        </p:nvPicPr>
+        <p:blipFill>
+          <a:blip r:embed="rId2" cstate="print"/>
+          <a:srcRect r="18813"/>
+          <a:stretch>
+            <a:fillRect/>
+          </a:stretch>
+        </p:blipFill>
+        <p:spPr bwMode="auto">
+          <a:xfrm>
+            <a:off x="7494494" y="0"/>
+            <a:ext cx="1649506" cy="1533344"/>
+          </a:xfrm>
+          <a:prstGeom prst="rect">
+            <a:avLst/>
+          </a:prstGeom>
+          <a:noFill/>
+          <a:ln w="9525">
+            <a:noFill/>
+            <a:miter lim="800000"/>
+            <a:headEnd/>
+            <a:tailEnd/>
+          </a:ln>
+        </p:spPr>
+      </p:pic>
     </p:spTree>
     <p:extLst>
       <p:ext uri="{BB962C8B-B14F-4D97-AF65-F5344CB8AC3E}">
@@ -5853,7 +5876,7 @@
         </p:nvSpPr>
         <p:spPr>
           <a:xfrm>
-            <a:off x="381000" y="1524000"/>
+            <a:off x="381000" y="1676400"/>
             <a:ext cx="8458200" cy="5262979"/>
           </a:xfrm>
           <a:prstGeom prst="rect">
@@ -5872,11 +5895,7 @@
             </a:pPr>
             <a:r>
               <a:rPr lang="en-US" sz="2800" dirty="0" smtClean="0"/>
-              <a:t>Brainstormed </a:t>
-            </a:r>
-            <a:r>
-              <a:rPr lang="en-US" sz="2800" dirty="0" smtClean="0"/>
-              <a:t>“habitat” ontology importing ENVO</a:t>
+              <a:t>Brainstormed “habitat” ontology importing ENVO</a:t>
             </a:r>
           </a:p>
           <a:p>
@@ -5945,11 +5964,7 @@
             </a:pPr>
             <a:r>
               <a:rPr lang="en-US" sz="2800" dirty="0" smtClean="0"/>
-              <a:t>Connected to ENVO curators (Thanks Melissa</a:t>
-            </a:r>
-            <a:r>
-              <a:rPr lang="en-US" sz="2800" dirty="0" smtClean="0"/>
-              <a:t>)</a:t>
+              <a:t>Connected to ENVO curators (Thanks Melissa)</a:t>
             </a:r>
           </a:p>
           <a:p>
@@ -5971,6 +5986,38 @@
           </a:p>
         </p:txBody>
       </p:sp>
+      <p:pic>
+        <p:nvPicPr>
+          <p:cNvPr id="4" name="Picture 3" descr="monarch"/>
+          <p:cNvPicPr>
+            <a:picLocks noChangeAspect="1" noChangeArrowheads="1"/>
+          </p:cNvPicPr>
+          <p:nvPr/>
+        </p:nvPicPr>
+        <p:blipFill>
+          <a:blip r:embed="rId2" cstate="print"/>
+          <a:srcRect r="18813"/>
+          <a:stretch>
+            <a:fillRect/>
+          </a:stretch>
+        </p:blipFill>
+        <p:spPr bwMode="auto">
+          <a:xfrm>
+            <a:off x="7485529" y="0"/>
+            <a:ext cx="1649506" cy="1533344"/>
+          </a:xfrm>
+          <a:prstGeom prst="rect">
+            <a:avLst/>
+          </a:prstGeom>
+          <a:noFill/>
+          <a:ln w="9525">
+            <a:noFill/>
+            <a:miter lim="800000"/>
+            <a:headEnd/>
+            <a:tailEnd/>
+          </a:ln>
+        </p:spPr>
+      </p:pic>
     </p:spTree>
     <p:extLst>
       <p:ext uri="{BB962C8B-B14F-4D97-AF65-F5344CB8AC3E}">

</xml_diff>

<commit_message>
with corrected email [Elise]
git-svn-id: http://nescent-anatomy-course.googlecode.com/svn/trunk/2013_course@366 586f635c-ba50-3696-6e8c-0f279cf0028a
</commit_message>
<xml_diff>
--- a/user/shared/Larsen_NESCENT_2013.pptx
+++ b/user/shared/Larsen_NESCENT_2013.pptx
@@ -3202,16 +3202,10 @@
               <a:buNone/>
             </a:pPr>
             <a:r>
-              <a:rPr lang="en-US" sz="1800" dirty="0">
-                <a:hlinkClick r:id="rId2"/>
-              </a:rPr>
-              <a:t>e</a:t>
-            </a:r>
-            <a:r>
               <a:rPr lang="en-US" sz="1800" dirty="0" smtClean="0">
                 <a:hlinkClick r:id="rId2"/>
               </a:rPr>
-              <a:t>liselarsen.umd@gmail.com</a:t>
+              <a:t>ealarsen.umd@gmail.com</a:t>
             </a:r>
             <a:endParaRPr lang="en-US" sz="1800" dirty="0" smtClean="0"/>
           </a:p>

</xml_diff>